<commit_message>
Task 11 and project files added
</commit_message>
<xml_diff>
--- a/_0. DWH/Projects/Aksana_Kuratnik/docs/Amazon Sales Analysis.pptx
+++ b/_0. DWH/Projects/Aksana_Kuratnik/docs/Amazon Sales Analysis.pptx
@@ -114,6 +114,11 @@
       </a:defRPr>
     </a:lvl9pPr>
   </p:defaultTextStyle>
+  <p:extLst>
+    <p:ext uri="{EFAFB233-063F-42B5-8137-9DF3F51BA10A}">
+      <p15:sldGuideLst xmlns:p15="http://schemas.microsoft.com/office/powerpoint/2012/main"/>
+    </p:ext>
+  </p:extLst>
 </p:presentation>
 </file>
 
@@ -248,7 +253,7 @@
           <a:p>
             <a:fld id="{013280D8-06C7-4D1B-8FEA-67E7C4F6136F}" type="datetimeFigureOut">
               <a:rPr lang="en-US" smtClean="0"/>
-              <a:t>12/2/2017</a:t>
+              <a:t>12/9/2017</a:t>
             </a:fld>
             <a:endParaRPr lang="en-US"/>
           </a:p>
@@ -418,7 +423,7 @@
           <a:p>
             <a:fld id="{013280D8-06C7-4D1B-8FEA-67E7C4F6136F}" type="datetimeFigureOut">
               <a:rPr lang="en-US" smtClean="0"/>
-              <a:t>12/2/2017</a:t>
+              <a:t>12/9/2017</a:t>
             </a:fld>
             <a:endParaRPr lang="en-US"/>
           </a:p>
@@ -598,7 +603,7 @@
           <a:p>
             <a:fld id="{013280D8-06C7-4D1B-8FEA-67E7C4F6136F}" type="datetimeFigureOut">
               <a:rPr lang="en-US" smtClean="0"/>
-              <a:t>12/2/2017</a:t>
+              <a:t>12/9/2017</a:t>
             </a:fld>
             <a:endParaRPr lang="en-US"/>
           </a:p>
@@ -768,7 +773,7 @@
           <a:p>
             <a:fld id="{013280D8-06C7-4D1B-8FEA-67E7C4F6136F}" type="datetimeFigureOut">
               <a:rPr lang="en-US" smtClean="0"/>
-              <a:t>12/2/2017</a:t>
+              <a:t>12/9/2017</a:t>
             </a:fld>
             <a:endParaRPr lang="en-US"/>
           </a:p>
@@ -1014,7 +1019,7 @@
           <a:p>
             <a:fld id="{013280D8-06C7-4D1B-8FEA-67E7C4F6136F}" type="datetimeFigureOut">
               <a:rPr lang="en-US" smtClean="0"/>
-              <a:t>12/2/2017</a:t>
+              <a:t>12/9/2017</a:t>
             </a:fld>
             <a:endParaRPr lang="en-US"/>
           </a:p>
@@ -1246,7 +1251,7 @@
           <a:p>
             <a:fld id="{013280D8-06C7-4D1B-8FEA-67E7C4F6136F}" type="datetimeFigureOut">
               <a:rPr lang="en-US" smtClean="0"/>
-              <a:t>12/2/2017</a:t>
+              <a:t>12/9/2017</a:t>
             </a:fld>
             <a:endParaRPr lang="en-US"/>
           </a:p>
@@ -1613,7 +1618,7 @@
           <a:p>
             <a:fld id="{013280D8-06C7-4D1B-8FEA-67E7C4F6136F}" type="datetimeFigureOut">
               <a:rPr lang="en-US" smtClean="0"/>
-              <a:t>12/2/2017</a:t>
+              <a:t>12/9/2017</a:t>
             </a:fld>
             <a:endParaRPr lang="en-US"/>
           </a:p>
@@ -1731,7 +1736,7 @@
           <a:p>
             <a:fld id="{013280D8-06C7-4D1B-8FEA-67E7C4F6136F}" type="datetimeFigureOut">
               <a:rPr lang="en-US" smtClean="0"/>
-              <a:t>12/2/2017</a:t>
+              <a:t>12/9/2017</a:t>
             </a:fld>
             <a:endParaRPr lang="en-US"/>
           </a:p>
@@ -1826,7 +1831,7 @@
           <a:p>
             <a:fld id="{013280D8-06C7-4D1B-8FEA-67E7C4F6136F}" type="datetimeFigureOut">
               <a:rPr lang="en-US" smtClean="0"/>
-              <a:t>12/2/2017</a:t>
+              <a:t>12/9/2017</a:t>
             </a:fld>
             <a:endParaRPr lang="en-US"/>
           </a:p>
@@ -2103,7 +2108,7 @@
           <a:p>
             <a:fld id="{013280D8-06C7-4D1B-8FEA-67E7C4F6136F}" type="datetimeFigureOut">
               <a:rPr lang="en-US" smtClean="0"/>
-              <a:t>12/2/2017</a:t>
+              <a:t>12/9/2017</a:t>
             </a:fld>
             <a:endParaRPr lang="en-US"/>
           </a:p>
@@ -2356,7 +2361,7 @@
           <a:p>
             <a:fld id="{013280D8-06C7-4D1B-8FEA-67E7C4F6136F}" type="datetimeFigureOut">
               <a:rPr lang="en-US" smtClean="0"/>
-              <a:t>12/2/2017</a:t>
+              <a:t>12/9/2017</a:t>
             </a:fld>
             <a:endParaRPr lang="en-US"/>
           </a:p>
@@ -2569,7 +2574,7 @@
           <a:p>
             <a:fld id="{013280D8-06C7-4D1B-8FEA-67E7C4F6136F}" type="datetimeFigureOut">
               <a:rPr lang="en-US" smtClean="0"/>
-              <a:t>12/2/2017</a:t>
+              <a:t>12/9/2017</a:t>
             </a:fld>
             <a:endParaRPr lang="en-US"/>
           </a:p>
@@ -3698,7 +3703,7 @@
         </p:nvSpPr>
         <p:spPr>
           <a:xfrm>
-            <a:off x="2868478" y="2673458"/>
+            <a:off x="1733049" y="2673454"/>
             <a:ext cx="1602783" cy="813661"/>
           </a:xfrm>
           <a:prstGeom prst="rect">
@@ -3740,7 +3745,7 @@
         </p:nvSpPr>
         <p:spPr>
           <a:xfrm>
-            <a:off x="5004661" y="2673457"/>
+            <a:off x="3869232" y="2673453"/>
             <a:ext cx="1602783" cy="813661"/>
           </a:xfrm>
           <a:prstGeom prst="rect">
@@ -3768,7 +3773,7 @@
             <a:pPr algn="ctr"/>
             <a:r>
               <a:rPr lang="en-US" dirty="0" smtClean="0"/>
-              <a:t>BL_CL</a:t>
+              <a:t>BL_CL_1ST</a:t>
             </a:r>
             <a:endParaRPr lang="en-US" dirty="0"/>
           </a:p>
@@ -3782,7 +3787,7 @@
         </p:nvSpPr>
         <p:spPr>
           <a:xfrm>
-            <a:off x="7140844" y="2673456"/>
+            <a:off x="6014846" y="2673453"/>
             <a:ext cx="1602783" cy="813661"/>
           </a:xfrm>
           <a:prstGeom prst="rect">
@@ -3824,7 +3829,7 @@
         </p:nvSpPr>
         <p:spPr>
           <a:xfrm>
-            <a:off x="9277027" y="2673456"/>
+            <a:off x="10275820" y="2648698"/>
             <a:ext cx="1602783" cy="813661"/>
           </a:xfrm>
           <a:prstGeom prst="rect">
@@ -3866,7 +3871,7 @@
         </p:nvSpPr>
         <p:spPr>
           <a:xfrm>
-            <a:off x="4471261" y="2919489"/>
+            <a:off x="3335832" y="2919485"/>
             <a:ext cx="533400" cy="321593"/>
           </a:xfrm>
           <a:prstGeom prst="rightArrow">
@@ -3904,7 +3909,7 @@
         </p:nvSpPr>
         <p:spPr>
           <a:xfrm>
-            <a:off x="6607444" y="2919489"/>
+            <a:off x="5472015" y="2919485"/>
             <a:ext cx="533400" cy="321593"/>
           </a:xfrm>
           <a:prstGeom prst="rightArrow">
@@ -3942,7 +3947,7 @@
         </p:nvSpPr>
         <p:spPr>
           <a:xfrm>
-            <a:off x="8743627" y="2906894"/>
+            <a:off x="9757547" y="2917914"/>
             <a:ext cx="533400" cy="321593"/>
           </a:xfrm>
           <a:prstGeom prst="rightArrow">
@@ -3980,7 +3985,7 @@
         </p:nvSpPr>
         <p:spPr>
           <a:xfrm>
-            <a:off x="1265695" y="2698620"/>
+            <a:off x="130266" y="2698616"/>
             <a:ext cx="1613115" cy="247973"/>
           </a:xfrm>
           <a:prstGeom prst="rightArrow">
@@ -4022,7 +4027,7 @@
         </p:nvSpPr>
         <p:spPr>
           <a:xfrm>
-            <a:off x="1250197" y="2968358"/>
+            <a:off x="114768" y="2968354"/>
             <a:ext cx="1613115" cy="247973"/>
           </a:xfrm>
           <a:prstGeom prst="rightArrow">
@@ -4064,7 +4069,7 @@
         </p:nvSpPr>
         <p:spPr>
           <a:xfrm>
-            <a:off x="1250196" y="3247854"/>
+            <a:off x="114767" y="3247850"/>
             <a:ext cx="1613115" cy="247973"/>
           </a:xfrm>
           <a:prstGeom prst="rightArrow">
@@ -4095,6 +4100,86 @@
               <a:t>Flat files</a:t>
             </a:r>
             <a:endParaRPr lang="en-US" dirty="0"/>
+          </a:p>
+        </p:txBody>
+      </p:sp>
+      <p:sp>
+        <p:nvSpPr>
+          <p:cNvPr id="16" name="Rectangle 15"/>
+          <p:cNvSpPr/>
+          <p:nvPr/>
+        </p:nvSpPr>
+        <p:spPr>
+          <a:xfrm>
+            <a:off x="8145333" y="2648699"/>
+            <a:ext cx="1602783" cy="813661"/>
+          </a:xfrm>
+          <a:prstGeom prst="rect">
+            <a:avLst/>
+          </a:prstGeom>
+        </p:spPr>
+        <p:style>
+          <a:lnRef idx="1">
+            <a:schemeClr val="accent5"/>
+          </a:lnRef>
+          <a:fillRef idx="2">
+            <a:schemeClr val="accent5"/>
+          </a:fillRef>
+          <a:effectRef idx="1">
+            <a:schemeClr val="accent5"/>
+          </a:effectRef>
+          <a:fontRef idx="minor">
+            <a:schemeClr val="dk1"/>
+          </a:fontRef>
+        </p:style>
+        <p:txBody>
+          <a:bodyPr rtlCol="0" anchor="ctr"/>
+          <a:lstStyle/>
+          <a:p>
+            <a:pPr algn="ctr"/>
+            <a:r>
+              <a:rPr lang="en-US" dirty="0" smtClean="0"/>
+              <a:t>BL_CL_2ND</a:t>
+            </a:r>
+            <a:endParaRPr lang="en-US" dirty="0"/>
+          </a:p>
+        </p:txBody>
+      </p:sp>
+      <p:sp>
+        <p:nvSpPr>
+          <p:cNvPr id="20" name="Right Arrow 19"/>
+          <p:cNvSpPr/>
+          <p:nvPr/>
+        </p:nvSpPr>
+        <p:spPr>
+          <a:xfrm>
+            <a:off x="7611933" y="2894734"/>
+            <a:ext cx="533400" cy="321593"/>
+          </a:xfrm>
+          <a:prstGeom prst="rightArrow">
+            <a:avLst/>
+          </a:prstGeom>
+        </p:spPr>
+        <p:style>
+          <a:lnRef idx="1">
+            <a:schemeClr val="accent5"/>
+          </a:lnRef>
+          <a:fillRef idx="2">
+            <a:schemeClr val="accent5"/>
+          </a:fillRef>
+          <a:effectRef idx="1">
+            <a:schemeClr val="accent5"/>
+          </a:effectRef>
+          <a:fontRef idx="minor">
+            <a:schemeClr val="dk1"/>
+          </a:fontRef>
+        </p:style>
+        <p:txBody>
+          <a:bodyPr rtlCol="0" anchor="ctr"/>
+          <a:lstStyle/>
+          <a:p>
+            <a:pPr algn="ctr"/>
+            <a:endParaRPr lang="en-US"/>
           </a:p>
         </p:txBody>
       </p:sp>

</xml_diff>